<commit_message>
updated slides with demo
</commit_message>
<xml_diff>
--- a/Cloud project presentation.pptx
+++ b/Cloud project presentation.pptx
@@ -14,23 +14,24 @@
     <p:sldId id="259" r:id="rId9"/>
     <p:sldId id="260" r:id="rId10"/>
     <p:sldId id="261" r:id="rId11"/>
+    <p:sldId id="262" r:id="rId12"/>
   </p:sldIdLst>
   <p:sldSz cy="5143500" cx="9144000"/>
   <p:notesSz cx="6858000" cy="9144000"/>
   <p:embeddedFontLst>
     <p:embeddedFont>
       <p:font typeface="Montserrat"/>
-      <p:regular r:id="rId12"/>
-      <p:bold r:id="rId13"/>
-      <p:italic r:id="rId14"/>
-      <p:boldItalic r:id="rId15"/>
+      <p:regular r:id="rId13"/>
+      <p:bold r:id="rId14"/>
+      <p:italic r:id="rId15"/>
+      <p:boldItalic r:id="rId16"/>
     </p:embeddedFont>
     <p:embeddedFont>
       <p:font typeface="Lato"/>
-      <p:regular r:id="rId16"/>
-      <p:bold r:id="rId17"/>
-      <p:italic r:id="rId18"/>
-      <p:boldItalic r:id="rId19"/>
+      <p:regular r:id="rId17"/>
+      <p:bold r:id="rId18"/>
+      <p:italic r:id="rId19"/>
+      <p:boldItalic r:id="rId20"/>
     </p:embeddedFont>
   </p:embeddedFontLst>
   <p:defaultTextStyle>
@@ -1257,6 +1258,105 @@
       <p:sp>
         <p:nvSpPr>
           <p:cNvPr id="164" name="Google Shape;164;g6c50081247_0_136:notes"/>
+          <p:cNvSpPr txBox="1"/>
+          <p:nvPr>
+            <p:ph idx="1" type="body"/>
+          </p:nvPr>
+        </p:nvSpPr>
+        <p:spPr>
+          <a:xfrm>
+            <a:off x="685800" y="4343400"/>
+            <a:ext cx="5486400" cy="4114800"/>
+          </a:xfrm>
+          <a:prstGeom prst="rect">
+            <a:avLst/>
+          </a:prstGeom>
+        </p:spPr>
+        <p:txBody>
+          <a:bodyPr anchorCtr="0" anchor="t" bIns="91425" lIns="91425" spcFirstLastPara="1" rIns="91425" wrap="square" tIns="91425">
+            <a:noAutofit/>
+          </a:bodyPr>
+          <a:lstStyle/>
+          <a:p>
+            <a:pPr indent="0" lvl="0" marL="0" rtl="0" algn="l">
+              <a:spcBef>
+                <a:spcPts val="0"/>
+              </a:spcBef>
+              <a:spcAft>
+                <a:spcPts val="0"/>
+              </a:spcAft>
+              <a:buNone/>
+            </a:pPr>
+            <a:r>
+              <a:t/>
+            </a:r>
+            <a:endParaRPr/>
+          </a:p>
+        </p:txBody>
+      </p:sp>
+    </p:spTree>
+  </p:cSld>
+  <p:clrMapOvr>
+    <a:masterClrMapping/>
+  </p:clrMapOvr>
+</p:notes>
+</file>
+
+<file path=ppt/notesSlides/notesSlide7.xml><?xml version="1.0" encoding="utf-8"?>
+<p:notes xmlns:a="http://schemas.openxmlformats.org/drawingml/2006/main" xmlns:r="http://schemas.openxmlformats.org/officeDocument/2006/relationships" xmlns:mc="http://schemas.openxmlformats.org/markup-compatibility/2006" xmlns:mv="urn:schemas-microsoft-com:mac:vml" xmlns:p="http://schemas.openxmlformats.org/presentationml/2006/main" xmlns:c="http://schemas.openxmlformats.org/drawingml/2006/chart" xmlns:dgm="http://schemas.openxmlformats.org/drawingml/2006/diagram" xmlns:o="urn:schemas-microsoft-com:office:office" xmlns:v="urn:schemas-microsoft-com:vml" xmlns:pvml="urn:schemas-microsoft-com:office:powerpoint" xmlns:com="http://schemas.openxmlformats.org/drawingml/2006/compatibility" xmlns:p14="http://schemas.microsoft.com/office/powerpoint/2010/main" xmlns:p15="http://schemas.microsoft.com/office/powerpoint/2012/main" showMasterPhAnim="0" showMasterSp="0">
+  <p:cSld>
+    <p:spTree>
+      <p:nvGrpSpPr>
+        <p:cNvPr id="169" name="Shape 169"/>
+        <p:cNvGrpSpPr/>
+        <p:nvPr/>
+      </p:nvGrpSpPr>
+      <p:grpSpPr>
+        <a:xfrm>
+          <a:off x="0" y="0"/>
+          <a:ext cx="0" cy="0"/>
+          <a:chOff x="0" y="0"/>
+          <a:chExt cx="0" cy="0"/>
+        </a:xfrm>
+      </p:grpSpPr>
+      <p:sp>
+        <p:nvSpPr>
+          <p:cNvPr id="170" name="Google Shape;170;g6c50081247_0_157:notes"/>
+          <p:cNvSpPr/>
+          <p:nvPr>
+            <p:ph idx="2" type="sldImg"/>
+          </p:nvPr>
+        </p:nvSpPr>
+        <p:spPr>
+          <a:xfrm>
+            <a:off x="381300" y="685800"/>
+            <a:ext cx="6096000" cy="3429000"/>
+          </a:xfrm>
+          <a:custGeom>
+            <a:rect b="b" l="l" r="r" t="t"/>
+            <a:pathLst>
+              <a:path extrusionOk="0" h="120000" w="120000">
+                <a:moveTo>
+                  <a:pt x="0" y="0"/>
+                </a:moveTo>
+                <a:lnTo>
+                  <a:pt x="120000" y="0"/>
+                </a:lnTo>
+                <a:lnTo>
+                  <a:pt x="120000" y="120000"/>
+                </a:lnTo>
+                <a:lnTo>
+                  <a:pt x="0" y="120000"/>
+                </a:lnTo>
+                <a:close/>
+              </a:path>
+            </a:pathLst>
+          </a:custGeom>
+        </p:spPr>
+      </p:sp>
+      <p:sp>
+        <p:nvSpPr>
+          <p:cNvPr id="171" name="Google Shape;171;g6c50081247_0_157:notes"/>
           <p:cNvSpPr txBox="1"/>
           <p:nvPr>
             <p:ph idx="1" type="body"/>
@@ -10501,6 +10601,127 @@
 </p:sld>
 </file>
 
+<file path=ppt/slides/slide7.xml><?xml version="1.0" encoding="utf-8"?>
+<p:sld xmlns:a="http://schemas.openxmlformats.org/drawingml/2006/main" xmlns:r="http://schemas.openxmlformats.org/officeDocument/2006/relationships" xmlns:mc="http://schemas.openxmlformats.org/markup-compatibility/2006" xmlns:mv="urn:schemas-microsoft-com:mac:vml" xmlns:p="http://schemas.openxmlformats.org/presentationml/2006/main" xmlns:c="http://schemas.openxmlformats.org/drawingml/2006/chart" xmlns:dgm="http://schemas.openxmlformats.org/drawingml/2006/diagram" xmlns:o="urn:schemas-microsoft-com:office:office" xmlns:v="urn:schemas-microsoft-com:vml" xmlns:pvml="urn:schemas-microsoft-com:office:powerpoint" xmlns:com="http://schemas.openxmlformats.org/drawingml/2006/compatibility" xmlns:p14="http://schemas.microsoft.com/office/powerpoint/2010/main" xmlns:p15="http://schemas.microsoft.com/office/powerpoint/2012/main">
+  <p:cSld>
+    <p:spTree>
+      <p:nvGrpSpPr>
+        <p:cNvPr id="172" name="Shape 172"/>
+        <p:cNvGrpSpPr/>
+        <p:nvPr/>
+      </p:nvGrpSpPr>
+      <p:grpSpPr>
+        <a:xfrm>
+          <a:off x="0" y="0"/>
+          <a:ext cx="0" cy="0"/>
+          <a:chOff x="0" y="0"/>
+          <a:chExt cx="0" cy="0"/>
+        </a:xfrm>
+      </p:grpSpPr>
+      <p:sp>
+        <p:nvSpPr>
+          <p:cNvPr id="173" name="Google Shape;173;p19"/>
+          <p:cNvSpPr txBox="1"/>
+          <p:nvPr>
+            <p:ph type="title"/>
+          </p:nvPr>
+        </p:nvSpPr>
+        <p:spPr>
+          <a:xfrm>
+            <a:off x="1297500" y="393750"/>
+            <a:ext cx="7038900" cy="914100"/>
+          </a:xfrm>
+          <a:prstGeom prst="rect">
+            <a:avLst/>
+          </a:prstGeom>
+        </p:spPr>
+        <p:txBody>
+          <a:bodyPr anchorCtr="0" anchor="t" bIns="91425" lIns="91425" spcFirstLastPara="1" rIns="91425" wrap="square" tIns="91425">
+            <a:noAutofit/>
+          </a:bodyPr>
+          <a:lstStyle/>
+          <a:p>
+            <a:pPr indent="0" lvl="0" marL="0" rtl="0" algn="l">
+              <a:spcBef>
+                <a:spcPts val="0"/>
+              </a:spcBef>
+              <a:spcAft>
+                <a:spcPts val="0"/>
+              </a:spcAft>
+              <a:buNone/>
+            </a:pPr>
+            <a:r>
+              <a:rPr lang="en"/>
+              <a:t>Demo</a:t>
+            </a:r>
+            <a:endParaRPr/>
+          </a:p>
+        </p:txBody>
+      </p:sp>
+      <p:pic>
+        <p:nvPicPr>
+          <p:cNvPr id="174" name="Google Shape;174;p19"/>
+          <p:cNvPicPr preferRelativeResize="0"/>
+          <p:nvPr/>
+        </p:nvPicPr>
+        <p:blipFill>
+          <a:blip r:embed="rId3">
+            <a:alphaModFix/>
+          </a:blip>
+          <a:stretch>
+            <a:fillRect/>
+          </a:stretch>
+        </p:blipFill>
+        <p:spPr>
+          <a:xfrm>
+            <a:off x="1346534" y="1307850"/>
+            <a:ext cx="6450926" cy="2087275"/>
+          </a:xfrm>
+          <a:prstGeom prst="rect">
+            <a:avLst/>
+          </a:prstGeom>
+          <a:noFill/>
+          <a:ln>
+            <a:noFill/>
+          </a:ln>
+        </p:spPr>
+      </p:pic>
+      <p:pic>
+        <p:nvPicPr>
+          <p:cNvPr id="175" name="Google Shape;175;p19"/>
+          <p:cNvPicPr preferRelativeResize="0"/>
+          <p:nvPr/>
+        </p:nvPicPr>
+        <p:blipFill>
+          <a:blip r:embed="rId4">
+            <a:alphaModFix/>
+          </a:blip>
+          <a:stretch>
+            <a:fillRect/>
+          </a:stretch>
+        </p:blipFill>
+        <p:spPr>
+          <a:xfrm>
+            <a:off x="1346525" y="3565000"/>
+            <a:ext cx="6450925" cy="561975"/>
+          </a:xfrm>
+          <a:prstGeom prst="rect">
+            <a:avLst/>
+          </a:prstGeom>
+          <a:noFill/>
+          <a:ln>
+            <a:noFill/>
+          </a:ln>
+        </p:spPr>
+      </p:pic>
+    </p:spTree>
+  </p:cSld>
+  <p:clrMapOvr>
+    <a:masterClrMapping/>
+  </p:clrMapOvr>
+</p:sld>
+</file>
+
 <file path=ppt/theme/theme1.xml><?xml version="1.0" encoding="utf-8"?>
 <a:theme xmlns:a="http://schemas.openxmlformats.org/drawingml/2006/main" xmlns:r="http://schemas.openxmlformats.org/officeDocument/2006/relationships">
   <a:themeElements>

</xml_diff>